<commit_message>
Added optical flow basics
Updated seminar with optical flow note
</commit_message>
<xml_diff>
--- a/Docs/Final/Presentation/McDonnell_FinalSeminar.pptx
+++ b/Docs/Final/Presentation/McDonnell_FinalSeminar.pptx
@@ -8,7 +8,8 @@
     <p:sldId id="256" r:id="rId2"/>
     <p:sldId id="257" r:id="rId3"/>
     <p:sldId id="258" r:id="rId4"/>
-    <p:sldId id="259" r:id="rId5"/>
+    <p:sldId id="260" r:id="rId5"/>
+    <p:sldId id="259" r:id="rId6"/>
   </p:sldIdLst>
   <p:sldSz cx="12192000" cy="6858000"/>
   <p:notesSz cx="6858000" cy="9144000"/>
@@ -107,6 +108,11 @@
       </a:defRPr>
     </a:lvl9pPr>
   </p:defaultTextStyle>
+  <p:extLst>
+    <p:ext uri="{EFAFB233-063F-42B5-8137-9DF3F51BA10A}">
+      <p15:sldGuideLst xmlns:p15="http://schemas.microsoft.com/office/powerpoint/2012/main"/>
+    </p:ext>
+  </p:extLst>
 </p:presentation>
 </file>
 
@@ -259,7 +265,7 @@
           <a:p>
             <a:fld id="{94ABC9E6-512C-4182-ACB5-F78238EC3847}" type="datetimeFigureOut">
               <a:rPr lang="en-AU" smtClean="0"/>
-              <a:t>6/09/2019</a:t>
+              <a:t>3/10/2019</a:t>
             </a:fld>
             <a:endParaRPr lang="en-AU"/>
           </a:p>
@@ -459,7 +465,7 @@
           <a:p>
             <a:fld id="{94ABC9E6-512C-4182-ACB5-F78238EC3847}" type="datetimeFigureOut">
               <a:rPr lang="en-AU" smtClean="0"/>
-              <a:t>6/09/2019</a:t>
+              <a:t>3/10/2019</a:t>
             </a:fld>
             <a:endParaRPr lang="en-AU"/>
           </a:p>
@@ -669,7 +675,7 @@
           <a:p>
             <a:fld id="{94ABC9E6-512C-4182-ACB5-F78238EC3847}" type="datetimeFigureOut">
               <a:rPr lang="en-AU" smtClean="0"/>
-              <a:t>6/09/2019</a:t>
+              <a:t>3/10/2019</a:t>
             </a:fld>
             <a:endParaRPr lang="en-AU"/>
           </a:p>
@@ -869,7 +875,7 @@
           <a:p>
             <a:fld id="{94ABC9E6-512C-4182-ACB5-F78238EC3847}" type="datetimeFigureOut">
               <a:rPr lang="en-AU" smtClean="0"/>
-              <a:t>6/09/2019</a:t>
+              <a:t>3/10/2019</a:t>
             </a:fld>
             <a:endParaRPr lang="en-AU"/>
           </a:p>
@@ -1145,7 +1151,7 @@
           <a:p>
             <a:fld id="{94ABC9E6-512C-4182-ACB5-F78238EC3847}" type="datetimeFigureOut">
               <a:rPr lang="en-AU" smtClean="0"/>
-              <a:t>6/09/2019</a:t>
+              <a:t>3/10/2019</a:t>
             </a:fld>
             <a:endParaRPr lang="en-AU"/>
           </a:p>
@@ -1413,7 +1419,7 @@
           <a:p>
             <a:fld id="{94ABC9E6-512C-4182-ACB5-F78238EC3847}" type="datetimeFigureOut">
               <a:rPr lang="en-AU" smtClean="0"/>
-              <a:t>6/09/2019</a:t>
+              <a:t>3/10/2019</a:t>
             </a:fld>
             <a:endParaRPr lang="en-AU"/>
           </a:p>
@@ -1828,7 +1834,7 @@
           <a:p>
             <a:fld id="{94ABC9E6-512C-4182-ACB5-F78238EC3847}" type="datetimeFigureOut">
               <a:rPr lang="en-AU" smtClean="0"/>
-              <a:t>6/09/2019</a:t>
+              <a:t>3/10/2019</a:t>
             </a:fld>
             <a:endParaRPr lang="en-AU"/>
           </a:p>
@@ -1970,7 +1976,7 @@
           <a:p>
             <a:fld id="{94ABC9E6-512C-4182-ACB5-F78238EC3847}" type="datetimeFigureOut">
               <a:rPr lang="en-AU" smtClean="0"/>
-              <a:t>6/09/2019</a:t>
+              <a:t>3/10/2019</a:t>
             </a:fld>
             <a:endParaRPr lang="en-AU"/>
           </a:p>
@@ -2083,7 +2089,7 @@
           <a:p>
             <a:fld id="{94ABC9E6-512C-4182-ACB5-F78238EC3847}" type="datetimeFigureOut">
               <a:rPr lang="en-AU" smtClean="0"/>
-              <a:t>6/09/2019</a:t>
+              <a:t>3/10/2019</a:t>
             </a:fld>
             <a:endParaRPr lang="en-AU"/>
           </a:p>
@@ -2396,7 +2402,7 @@
           <a:p>
             <a:fld id="{94ABC9E6-512C-4182-ACB5-F78238EC3847}" type="datetimeFigureOut">
               <a:rPr lang="en-AU" smtClean="0"/>
-              <a:t>6/09/2019</a:t>
+              <a:t>3/10/2019</a:t>
             </a:fld>
             <a:endParaRPr lang="en-AU"/>
           </a:p>
@@ -2685,7 +2691,7 @@
           <a:p>
             <a:fld id="{94ABC9E6-512C-4182-ACB5-F78238EC3847}" type="datetimeFigureOut">
               <a:rPr lang="en-AU" smtClean="0"/>
-              <a:t>6/09/2019</a:t>
+              <a:t>3/10/2019</a:t>
             </a:fld>
             <a:endParaRPr lang="en-AU"/>
           </a:p>
@@ -2928,7 +2934,7 @@
           <a:p>
             <a:fld id="{94ABC9E6-512C-4182-ACB5-F78238EC3847}" type="datetimeFigureOut">
               <a:rPr lang="en-AU" smtClean="0"/>
-              <a:t>6/09/2019</a:t>
+              <a:t>3/10/2019</a:t>
             </a:fld>
             <a:endParaRPr lang="en-AU"/>
           </a:p>
@@ -3680,6 +3686,114 @@
 </file>
 
 <file path=ppt/slides/slide4.xml><?xml version="1.0" encoding="utf-8"?>
+<p:sld xmlns:a="http://schemas.openxmlformats.org/drawingml/2006/main" xmlns:r="http://schemas.openxmlformats.org/officeDocument/2006/relationships" xmlns:p="http://schemas.openxmlformats.org/presentationml/2006/main">
+  <p:cSld>
+    <p:spTree>
+      <p:nvGrpSpPr>
+        <p:cNvPr id="1" name=""/>
+        <p:cNvGrpSpPr/>
+        <p:nvPr/>
+      </p:nvGrpSpPr>
+      <p:grpSpPr>
+        <a:xfrm>
+          <a:off x="0" y="0"/>
+          <a:ext cx="0" cy="0"/>
+          <a:chOff x="0" y="0"/>
+          <a:chExt cx="0" cy="0"/>
+        </a:xfrm>
+      </p:grpSpPr>
+      <p:sp>
+        <p:nvSpPr>
+          <p:cNvPr id="2" name="Title 1">
+            <a:extLst>
+              <a:ext uri="{FF2B5EF4-FFF2-40B4-BE49-F238E27FC236}">
+                <a16:creationId xmlns:a16="http://schemas.microsoft.com/office/drawing/2014/main" id="{0CFC1D96-958E-4E70-8819-4C9F03348A57}"/>
+              </a:ext>
+            </a:extLst>
+          </p:cNvPr>
+          <p:cNvSpPr>
+            <a:spLocks noGrp="1"/>
+          </p:cNvSpPr>
+          <p:nvPr>
+            <p:ph type="title"/>
+          </p:nvPr>
+        </p:nvSpPr>
+        <p:spPr/>
+        <p:txBody>
+          <a:bodyPr/>
+          <a:lstStyle/>
+          <a:p>
+            <a:r>
+              <a:rPr lang="en-AU" dirty="0"/>
+              <a:t>Optical flow</a:t>
+            </a:r>
+          </a:p>
+        </p:txBody>
+      </p:sp>
+      <p:sp>
+        <p:nvSpPr>
+          <p:cNvPr id="3" name="Content Placeholder 2">
+            <a:extLst>
+              <a:ext uri="{FF2B5EF4-FFF2-40B4-BE49-F238E27FC236}">
+                <a16:creationId xmlns:a16="http://schemas.microsoft.com/office/drawing/2014/main" id="{CD20B0BC-B59B-4993-991E-9F5A3A4F8EE7}"/>
+              </a:ext>
+            </a:extLst>
+          </p:cNvPr>
+          <p:cNvSpPr>
+            <a:spLocks noGrp="1"/>
+          </p:cNvSpPr>
+          <p:nvPr>
+            <p:ph idx="1"/>
+          </p:nvPr>
+        </p:nvSpPr>
+        <p:spPr/>
+        <p:txBody>
+          <a:bodyPr/>
+          <a:lstStyle/>
+          <a:p>
+            <a:r>
+              <a:rPr lang="en-AU" dirty="0"/>
+              <a:t>Two-Frame Motion Estimation Based on Polynomial Expansion</a:t>
+            </a:r>
+          </a:p>
+          <a:p>
+            <a:pPr lvl="1"/>
+            <a:r>
+              <a:rPr lang="en-AU" dirty="0"/>
+              <a:t>Gunnar </a:t>
+            </a:r>
+            <a:r>
+              <a:rPr lang="en-AU" dirty="0" err="1"/>
+              <a:t>Farnebäck</a:t>
+            </a:r>
+            <a:endParaRPr lang="en-AU" dirty="0"/>
+          </a:p>
+          <a:p>
+            <a:pPr lvl="1"/>
+            <a:r>
+              <a:rPr lang="en-AU" dirty="0">
+                <a:hlinkClick r:id="rId2"/>
+              </a:rPr>
+              <a:t>http://www.diva-portal.org/smash/get/diva2:273847/FULLTEXT01.pdf</a:t>
+            </a:r>
+            <a:endParaRPr lang="en-AU" dirty="0"/>
+          </a:p>
+        </p:txBody>
+      </p:sp>
+    </p:spTree>
+    <p:extLst>
+      <p:ext uri="{BB962C8B-B14F-4D97-AF65-F5344CB8AC3E}">
+        <p14:creationId xmlns:p14="http://schemas.microsoft.com/office/powerpoint/2010/main" val="465041874"/>
+      </p:ext>
+    </p:extLst>
+  </p:cSld>
+  <p:clrMapOvr>
+    <a:masterClrMapping/>
+  </p:clrMapOvr>
+</p:sld>
+</file>
+
+<file path=ppt/slides/slide5.xml><?xml version="1.0" encoding="utf-8"?>
 <p:sld xmlns:a="http://schemas.openxmlformats.org/drawingml/2006/main" xmlns:r="http://schemas.openxmlformats.org/officeDocument/2006/relationships" xmlns:p="http://schemas.openxmlformats.org/presentationml/2006/main">
   <p:cSld>
     <p:spTree>

</xml_diff>